<commit_message>
Co-Authored-By: Rémi Delaune <delaune-remi@users.noreply.github.com>
</commit_message>
<xml_diff>
--- a/Partie_Remi/Compte_rendu/Presentation Partie_Remi.pptx
+++ b/Partie_Remi/Compte_rendu/Presentation Partie_Remi.pptx
@@ -16,6 +16,7 @@
     <p:sldId id="272" r:id="rId10"/>
     <p:sldId id="274" r:id="rId11"/>
     <p:sldId id="276" r:id="rId12"/>
+    <p:sldId id="277" r:id="rId13"/>
   </p:sldIdLst>
   <p:sldSz cx="12192000" cy="6858000"/>
   <p:notesSz cx="6858000" cy="9144000"/>
@@ -116,7 +117,7 @@
   </p:defaultTextStyle>
   <p:extLst>
     <p:ext uri="{EFAFB233-063F-42B5-8137-9DF3F51BA10A}">
-      <p15:sldGuideLst xmlns:p15="http://schemas.microsoft.com/office/powerpoint/2012/main">
+      <p15:sldGuideLst xmlns:p15="http://schemas.microsoft.com/office/powerpoint/2012/main" xmlns="">
         <p15:guide id="1" orient="horz" pos="2160">
           <p15:clr>
             <a:srgbClr val="A4A3A4"/>
@@ -171,7 +172,7 @@
             <a:alphaModFix amt="30000"/>
             <a:extLst>
               <a:ext uri="{28A0092B-C50C-407E-A947-70E740481C1C}">
-                <a14:useLocalDpi xmlns:a14="http://schemas.microsoft.com/office/drawing/2010/main" val="0"/>
+                <a14:useLocalDpi xmlns:a14="http://schemas.microsoft.com/office/drawing/2010/main" xmlns="" val="0"/>
               </a:ext>
             </a:extLst>
           </a:blip>
@@ -191,7 +192,7 @@
           <a:noFill/>
           <a:extLst>
             <a:ext uri="{909E8E84-426E-40dd-AFC4-6F175D3DCCD1}">
-              <a14:hiddenFill xmlns:a14="http://schemas.microsoft.com/office/drawing/2010/main" xmlns="">
+              <a14:hiddenFill xmlns="" xmlns:a14="http://schemas.microsoft.com/office/drawing/2010/main">
                 <a:solidFill>
                   <a:srgbClr val="FFFFFF"/>
                 </a:solidFill>
@@ -251,7 +252,7 @@
             </a:ln>
             <a:extLst>
               <a:ext uri="{91240B29-F687-4f45-9708-019B960494DF}">
-                <a14:hiddenLine xmlns:a14="http://schemas.microsoft.com/office/drawing/2010/main" xmlns="" w="9525">
+                <a14:hiddenLine xmlns="" xmlns:a14="http://schemas.microsoft.com/office/drawing/2010/main" w="9525">
                   <a:solidFill>
                     <a:srgbClr val="000000"/>
                   </a:solidFill>
@@ -341,7 +342,7 @@
             </a:ln>
             <a:extLst>
               <a:ext uri="{91240B29-F687-4f45-9708-019B960494DF}">
-                <a14:hiddenLine xmlns:a14="http://schemas.microsoft.com/office/drawing/2010/main" xmlns="" w="9525">
+                <a14:hiddenLine xmlns="" xmlns:a14="http://schemas.microsoft.com/office/drawing/2010/main" w="9525">
                   <a:solidFill>
                     <a:srgbClr val="000000"/>
                   </a:solidFill>
@@ -431,7 +432,7 @@
             </a:ln>
             <a:extLst>
               <a:ext uri="{91240B29-F687-4f45-9708-019B960494DF}">
-                <a14:hiddenLine xmlns:a14="http://schemas.microsoft.com/office/drawing/2010/main" xmlns="" w="9525">
+                <a14:hiddenLine xmlns="" xmlns:a14="http://schemas.microsoft.com/office/drawing/2010/main" w="9525">
                   <a:solidFill>
                     <a:srgbClr val="000000"/>
                   </a:solidFill>
@@ -465,7 +466,7 @@
             </a:ln>
             <a:extLst>
               <a:ext uri="{91240B29-F687-4f45-9708-019B960494DF}">
-                <a14:hiddenLine xmlns:a14="http://schemas.microsoft.com/office/drawing/2010/main" xmlns="" w="9525">
+                <a14:hiddenLine xmlns="" xmlns:a14="http://schemas.microsoft.com/office/drawing/2010/main" w="9525">
                   <a:solidFill>
                     <a:srgbClr val="000000"/>
                   </a:solidFill>
@@ -555,7 +556,7 @@
             </a:ln>
             <a:extLst>
               <a:ext uri="{91240B29-F687-4f45-9708-019B960494DF}">
-                <a14:hiddenLine xmlns:a14="http://schemas.microsoft.com/office/drawing/2010/main" xmlns="" w="9525">
+                <a14:hiddenLine xmlns="" xmlns:a14="http://schemas.microsoft.com/office/drawing/2010/main" w="9525">
                   <a:solidFill>
                     <a:srgbClr val="000000"/>
                   </a:solidFill>
@@ -617,7 +618,7 @@
             </a:ln>
             <a:extLst>
               <a:ext uri="{91240B29-F687-4f45-9708-019B960494DF}">
-                <a14:hiddenLine xmlns:a14="http://schemas.microsoft.com/office/drawing/2010/main" xmlns="" w="9525">
+                <a14:hiddenLine xmlns="" xmlns:a14="http://schemas.microsoft.com/office/drawing/2010/main" w="9525">
                   <a:solidFill>
                     <a:srgbClr val="000000"/>
                   </a:solidFill>
@@ -679,7 +680,7 @@
             </a:ln>
             <a:extLst>
               <a:ext uri="{91240B29-F687-4f45-9708-019B960494DF}">
-                <a14:hiddenLine xmlns:a14="http://schemas.microsoft.com/office/drawing/2010/main" xmlns="" w="9525">
+                <a14:hiddenLine xmlns="" xmlns:a14="http://schemas.microsoft.com/office/drawing/2010/main" w="9525">
                   <a:solidFill>
                     <a:srgbClr val="000000"/>
                   </a:solidFill>
@@ -769,7 +770,7 @@
             </a:ln>
             <a:extLst>
               <a:ext uri="{91240B29-F687-4f45-9708-019B960494DF}">
-                <a14:hiddenLine xmlns:a14="http://schemas.microsoft.com/office/drawing/2010/main" xmlns="" w="9525">
+                <a14:hiddenLine xmlns="" xmlns:a14="http://schemas.microsoft.com/office/drawing/2010/main" w="9525">
                   <a:solidFill>
                     <a:srgbClr val="000000"/>
                   </a:solidFill>
@@ -831,7 +832,7 @@
             </a:ln>
             <a:extLst>
               <a:ext uri="{91240B29-F687-4f45-9708-019B960494DF}">
-                <a14:hiddenLine xmlns:a14="http://schemas.microsoft.com/office/drawing/2010/main" xmlns="" w="9525">
+                <a14:hiddenLine xmlns="" xmlns:a14="http://schemas.microsoft.com/office/drawing/2010/main" w="9525">
                   <a:solidFill>
                     <a:srgbClr val="000000"/>
                   </a:solidFill>
@@ -893,7 +894,7 @@
             </a:ln>
             <a:extLst>
               <a:ext uri="{91240B29-F687-4f45-9708-019B960494DF}">
-                <a14:hiddenLine xmlns:a14="http://schemas.microsoft.com/office/drawing/2010/main" xmlns="" w="9525">
+                <a14:hiddenLine xmlns="" xmlns:a14="http://schemas.microsoft.com/office/drawing/2010/main" w="9525">
                   <a:solidFill>
                     <a:srgbClr val="000000"/>
                   </a:solidFill>
@@ -983,7 +984,7 @@
             </a:ln>
             <a:extLst>
               <a:ext uri="{91240B29-F687-4f45-9708-019B960494DF}">
-                <a14:hiddenLine xmlns:a14="http://schemas.microsoft.com/office/drawing/2010/main" xmlns="" w="9525">
+                <a14:hiddenLine xmlns="" xmlns:a14="http://schemas.microsoft.com/office/drawing/2010/main" w="9525">
                   <a:solidFill>
                     <a:srgbClr val="000000"/>
                   </a:solidFill>
@@ -1073,7 +1074,7 @@
             </a:ln>
             <a:extLst>
               <a:ext uri="{91240B29-F687-4f45-9708-019B960494DF}">
-                <a14:hiddenLine xmlns:a14="http://schemas.microsoft.com/office/drawing/2010/main" xmlns="" w="9525">
+                <a14:hiddenLine xmlns="" xmlns:a14="http://schemas.microsoft.com/office/drawing/2010/main" w="9525">
                   <a:solidFill>
                     <a:srgbClr val="000000"/>
                   </a:solidFill>
@@ -1135,7 +1136,7 @@
             </a:ln>
             <a:extLst>
               <a:ext uri="{91240B29-F687-4f45-9708-019B960494DF}">
-                <a14:hiddenLine xmlns:a14="http://schemas.microsoft.com/office/drawing/2010/main" xmlns="" w="9525">
+                <a14:hiddenLine xmlns="" xmlns:a14="http://schemas.microsoft.com/office/drawing/2010/main" w="9525">
                   <a:solidFill>
                     <a:srgbClr val="000000"/>
                   </a:solidFill>
@@ -1245,7 +1246,7 @@
             </a:ln>
             <a:extLst>
               <a:ext uri="{91240B29-F687-4f45-9708-019B960494DF}">
-                <a14:hiddenLine xmlns:a14="http://schemas.microsoft.com/office/drawing/2010/main" xmlns="" w="9525">
+                <a14:hiddenLine xmlns="" xmlns:a14="http://schemas.microsoft.com/office/drawing/2010/main" w="9525">
                   <a:solidFill>
                     <a:srgbClr val="000000"/>
                   </a:solidFill>
@@ -1307,7 +1308,7 @@
             </a:ln>
             <a:extLst>
               <a:ext uri="{91240B29-F687-4f45-9708-019B960494DF}">
-                <a14:hiddenLine xmlns:a14="http://schemas.microsoft.com/office/drawing/2010/main" xmlns="" w="9525">
+                <a14:hiddenLine xmlns="" xmlns:a14="http://schemas.microsoft.com/office/drawing/2010/main" w="9525">
                   <a:solidFill>
                     <a:srgbClr val="000000"/>
                   </a:solidFill>
@@ -1397,7 +1398,7 @@
             </a:ln>
             <a:extLst>
               <a:ext uri="{91240B29-F687-4f45-9708-019B960494DF}">
-                <a14:hiddenLine xmlns:a14="http://schemas.microsoft.com/office/drawing/2010/main" xmlns="" w="9525">
+                <a14:hiddenLine xmlns="" xmlns:a14="http://schemas.microsoft.com/office/drawing/2010/main" w="9525">
                   <a:solidFill>
                     <a:srgbClr val="000000"/>
                   </a:solidFill>
@@ -1487,7 +1488,7 @@
             </a:ln>
             <a:extLst>
               <a:ext uri="{91240B29-F687-4f45-9708-019B960494DF}">
-                <a14:hiddenLine xmlns:a14="http://schemas.microsoft.com/office/drawing/2010/main" xmlns="" w="9525">
+                <a14:hiddenLine xmlns="" xmlns:a14="http://schemas.microsoft.com/office/drawing/2010/main" w="9525">
                   <a:solidFill>
                     <a:srgbClr val="000000"/>
                   </a:solidFill>
@@ -1549,7 +1550,7 @@
             </a:ln>
             <a:extLst>
               <a:ext uri="{91240B29-F687-4f45-9708-019B960494DF}">
-                <a14:hiddenLine xmlns:a14="http://schemas.microsoft.com/office/drawing/2010/main" xmlns="" w="9525">
+                <a14:hiddenLine xmlns="" xmlns:a14="http://schemas.microsoft.com/office/drawing/2010/main" w="9525">
                   <a:solidFill>
                     <a:srgbClr val="000000"/>
                   </a:solidFill>
@@ -1639,7 +1640,7 @@
             </a:ln>
             <a:extLst>
               <a:ext uri="{91240B29-F687-4f45-9708-019B960494DF}">
-                <a14:hiddenLine xmlns:a14="http://schemas.microsoft.com/office/drawing/2010/main" xmlns="" w="9525">
+                <a14:hiddenLine xmlns="" xmlns:a14="http://schemas.microsoft.com/office/drawing/2010/main" w="9525">
                   <a:solidFill>
                     <a:srgbClr val="000000"/>
                   </a:solidFill>
@@ -1729,7 +1730,7 @@
             </a:ln>
             <a:extLst>
               <a:ext uri="{91240B29-F687-4f45-9708-019B960494DF}">
-                <a14:hiddenLine xmlns:a14="http://schemas.microsoft.com/office/drawing/2010/main" xmlns="" w="9525">
+                <a14:hiddenLine xmlns="" xmlns:a14="http://schemas.microsoft.com/office/drawing/2010/main" w="9525">
                   <a:solidFill>
                     <a:srgbClr val="000000"/>
                   </a:solidFill>
@@ -1785,7 +1786,7 @@
             </a:ln>
             <a:extLst>
               <a:ext uri="{91240B29-F687-4f45-9708-019B960494DF}">
-                <a14:hiddenLine xmlns:a14="http://schemas.microsoft.com/office/drawing/2010/main" xmlns="" w="9525">
+                <a14:hiddenLine xmlns="" xmlns:a14="http://schemas.microsoft.com/office/drawing/2010/main" w="9525">
                   <a:solidFill>
                     <a:srgbClr val="000000"/>
                   </a:solidFill>
@@ -1875,7 +1876,7 @@
             </a:ln>
             <a:extLst>
               <a:ext uri="{91240B29-F687-4f45-9708-019B960494DF}">
-                <a14:hiddenLine xmlns:a14="http://schemas.microsoft.com/office/drawing/2010/main" xmlns="" w="9525">
+                <a14:hiddenLine xmlns="" xmlns:a14="http://schemas.microsoft.com/office/drawing/2010/main" w="9525">
                   <a:solidFill>
                     <a:srgbClr val="000000"/>
                   </a:solidFill>
@@ -1931,7 +1932,7 @@
             </a:ln>
             <a:extLst>
               <a:ext uri="{91240B29-F687-4f45-9708-019B960494DF}">
-                <a14:hiddenLine xmlns:a14="http://schemas.microsoft.com/office/drawing/2010/main" xmlns="" w="9525">
+                <a14:hiddenLine xmlns="" xmlns:a14="http://schemas.microsoft.com/office/drawing/2010/main" w="9525">
                   <a:solidFill>
                     <a:srgbClr val="000000"/>
                   </a:solidFill>
@@ -2021,7 +2022,7 @@
             </a:ln>
             <a:extLst>
               <a:ext uri="{91240B29-F687-4f45-9708-019B960494DF}">
-                <a14:hiddenLine xmlns:a14="http://schemas.microsoft.com/office/drawing/2010/main" xmlns="" w="9525">
+                <a14:hiddenLine xmlns="" xmlns:a14="http://schemas.microsoft.com/office/drawing/2010/main" w="9525">
                   <a:solidFill>
                     <a:srgbClr val="000000"/>
                   </a:solidFill>
@@ -2089,7 +2090,7 @@
             </a:ln>
             <a:extLst>
               <a:ext uri="{91240B29-F687-4f45-9708-019B960494DF}">
-                <a14:hiddenLine xmlns:a14="http://schemas.microsoft.com/office/drawing/2010/main" xmlns="" w="9525">
+                <a14:hiddenLine xmlns="" xmlns:a14="http://schemas.microsoft.com/office/drawing/2010/main" w="9525">
                   <a:solidFill>
                     <a:srgbClr val="000000"/>
                   </a:solidFill>
@@ -2179,7 +2180,7 @@
             </a:ln>
             <a:extLst>
               <a:ext uri="{91240B29-F687-4f45-9708-019B960494DF}">
-                <a14:hiddenLine xmlns:a14="http://schemas.microsoft.com/office/drawing/2010/main" xmlns="" w="9525">
+                <a14:hiddenLine xmlns="" xmlns:a14="http://schemas.microsoft.com/office/drawing/2010/main" w="9525">
                   <a:solidFill>
                     <a:srgbClr val="000000"/>
                   </a:solidFill>
@@ -2247,7 +2248,7 @@
             </a:ln>
             <a:extLst>
               <a:ext uri="{91240B29-F687-4f45-9708-019B960494DF}">
-                <a14:hiddenLine xmlns:a14="http://schemas.microsoft.com/office/drawing/2010/main" xmlns="" w="9525">
+                <a14:hiddenLine xmlns="" xmlns:a14="http://schemas.microsoft.com/office/drawing/2010/main" w="9525">
                   <a:solidFill>
                     <a:srgbClr val="000000"/>
                   </a:solidFill>
@@ -2337,7 +2338,7 @@
             </a:ln>
             <a:extLst>
               <a:ext uri="{91240B29-F687-4f45-9708-019B960494DF}">
-                <a14:hiddenLine xmlns:a14="http://schemas.microsoft.com/office/drawing/2010/main" xmlns="" w="9525">
+                <a14:hiddenLine xmlns="" xmlns:a14="http://schemas.microsoft.com/office/drawing/2010/main" w="9525">
                   <a:solidFill>
                     <a:srgbClr val="000000"/>
                   </a:solidFill>
@@ -2371,7 +2372,7 @@
             </a:ln>
             <a:extLst>
               <a:ext uri="{91240B29-F687-4f45-9708-019B960494DF}">
-                <a14:hiddenLine xmlns:a14="http://schemas.microsoft.com/office/drawing/2010/main" xmlns="" w="9525">
+                <a14:hiddenLine xmlns="" xmlns:a14="http://schemas.microsoft.com/office/drawing/2010/main" w="9525">
                   <a:solidFill>
                     <a:srgbClr val="000000"/>
                   </a:solidFill>
@@ -2461,7 +2462,7 @@
             </a:ln>
             <a:extLst>
               <a:ext uri="{91240B29-F687-4f45-9708-019B960494DF}">
-                <a14:hiddenLine xmlns:a14="http://schemas.microsoft.com/office/drawing/2010/main" xmlns="" w="9525">
+                <a14:hiddenLine xmlns="" xmlns:a14="http://schemas.microsoft.com/office/drawing/2010/main" w="9525">
                   <a:solidFill>
                     <a:srgbClr val="000000"/>
                   </a:solidFill>
@@ -2523,7 +2524,7 @@
             </a:ln>
             <a:extLst>
               <a:ext uri="{91240B29-F687-4f45-9708-019B960494DF}">
-                <a14:hiddenLine xmlns:a14="http://schemas.microsoft.com/office/drawing/2010/main" xmlns="" w="9525">
+                <a14:hiddenLine xmlns="" xmlns:a14="http://schemas.microsoft.com/office/drawing/2010/main" w="9525">
                   <a:solidFill>
                     <a:srgbClr val="000000"/>
                   </a:solidFill>
@@ -2585,7 +2586,7 @@
             </a:ln>
             <a:extLst>
               <a:ext uri="{91240B29-F687-4f45-9708-019B960494DF}">
-                <a14:hiddenLine xmlns:a14="http://schemas.microsoft.com/office/drawing/2010/main" xmlns="" w="9525">
+                <a14:hiddenLine xmlns="" xmlns:a14="http://schemas.microsoft.com/office/drawing/2010/main" w="9525">
                   <a:solidFill>
                     <a:srgbClr val="000000"/>
                   </a:solidFill>
@@ -2675,7 +2676,7 @@
             </a:ln>
             <a:extLst>
               <a:ext uri="{91240B29-F687-4f45-9708-019B960494DF}">
-                <a14:hiddenLine xmlns:a14="http://schemas.microsoft.com/office/drawing/2010/main" xmlns="" w="9525">
+                <a14:hiddenLine xmlns="" xmlns:a14="http://schemas.microsoft.com/office/drawing/2010/main" w="9525">
                   <a:solidFill>
                     <a:srgbClr val="000000"/>
                   </a:solidFill>
@@ -2743,7 +2744,7 @@
             </a:ln>
             <a:extLst>
               <a:ext uri="{91240B29-F687-4f45-9708-019B960494DF}">
-                <a14:hiddenLine xmlns:a14="http://schemas.microsoft.com/office/drawing/2010/main" xmlns="" w="9525">
+                <a14:hiddenLine xmlns="" xmlns:a14="http://schemas.microsoft.com/office/drawing/2010/main" w="9525">
                   <a:solidFill>
                     <a:srgbClr val="000000"/>
                   </a:solidFill>
@@ -2805,7 +2806,7 @@
             </a:ln>
             <a:extLst>
               <a:ext uri="{91240B29-F687-4f45-9708-019B960494DF}">
-                <a14:hiddenLine xmlns:a14="http://schemas.microsoft.com/office/drawing/2010/main" xmlns="" w="9525">
+                <a14:hiddenLine xmlns="" xmlns:a14="http://schemas.microsoft.com/office/drawing/2010/main" w="9525">
                   <a:solidFill>
                     <a:srgbClr val="000000"/>
                   </a:solidFill>
@@ -2895,7 +2896,7 @@
             </a:ln>
             <a:extLst>
               <a:ext uri="{91240B29-F687-4f45-9708-019B960494DF}">
-                <a14:hiddenLine xmlns:a14="http://schemas.microsoft.com/office/drawing/2010/main" xmlns="" w="9525">
+                <a14:hiddenLine xmlns="" xmlns:a14="http://schemas.microsoft.com/office/drawing/2010/main" w="9525">
                   <a:solidFill>
                     <a:srgbClr val="000000"/>
                   </a:solidFill>
@@ -2957,7 +2958,7 @@
             </a:ln>
             <a:extLst>
               <a:ext uri="{91240B29-F687-4f45-9708-019B960494DF}">
-                <a14:hiddenLine xmlns:a14="http://schemas.microsoft.com/office/drawing/2010/main" xmlns="" w="9525">
+                <a14:hiddenLine xmlns="" xmlns:a14="http://schemas.microsoft.com/office/drawing/2010/main" w="9525">
                   <a:solidFill>
                     <a:srgbClr val="000000"/>
                   </a:solidFill>
@@ -3047,7 +3048,7 @@
             </a:ln>
             <a:extLst>
               <a:ext uri="{91240B29-F687-4f45-9708-019B960494DF}">
-                <a14:hiddenLine xmlns:a14="http://schemas.microsoft.com/office/drawing/2010/main" xmlns="" w="9525">
+                <a14:hiddenLine xmlns="" xmlns:a14="http://schemas.microsoft.com/office/drawing/2010/main" w="9525">
                   <a:solidFill>
                     <a:srgbClr val="000000"/>
                   </a:solidFill>
@@ -3109,7 +3110,7 @@
             </a:ln>
             <a:extLst>
               <a:ext uri="{91240B29-F687-4f45-9708-019B960494DF}">
-                <a14:hiddenLine xmlns:a14="http://schemas.microsoft.com/office/drawing/2010/main" xmlns="" w="9525">
+                <a14:hiddenLine xmlns="" xmlns:a14="http://schemas.microsoft.com/office/drawing/2010/main" w="9525">
                   <a:solidFill>
                     <a:srgbClr val="000000"/>
                   </a:solidFill>
@@ -3199,7 +3200,7 @@
             </a:ln>
             <a:extLst>
               <a:ext uri="{91240B29-F687-4f45-9708-019B960494DF}">
-                <a14:hiddenLine xmlns:a14="http://schemas.microsoft.com/office/drawing/2010/main" xmlns="" w="9525">
+                <a14:hiddenLine xmlns="" xmlns:a14="http://schemas.microsoft.com/office/drawing/2010/main" w="9525">
                   <a:solidFill>
                     <a:srgbClr val="000000"/>
                   </a:solidFill>
@@ -3233,7 +3234,7 @@
             </a:ln>
             <a:extLst>
               <a:ext uri="{91240B29-F687-4f45-9708-019B960494DF}">
-                <a14:hiddenLine xmlns:a14="http://schemas.microsoft.com/office/drawing/2010/main" xmlns="" w="9525">
+                <a14:hiddenLine xmlns="" xmlns:a14="http://schemas.microsoft.com/office/drawing/2010/main" w="9525">
                   <a:solidFill>
                     <a:srgbClr val="000000"/>
                   </a:solidFill>
@@ -3298,7 +3299,7 @@
             </a:ln>
             <a:extLst>
               <a:ext uri="{91240B29-F687-4f45-9708-019B960494DF}">
-                <a14:hiddenLine xmlns:a14="http://schemas.microsoft.com/office/drawing/2010/main" xmlns="" w="9525">
+                <a14:hiddenLine xmlns="" xmlns:a14="http://schemas.microsoft.com/office/drawing/2010/main" w="9525">
                   <a:solidFill>
                     <a:srgbClr val="000000"/>
                   </a:solidFill>
@@ -3388,7 +3389,7 @@
             </a:ln>
             <a:extLst>
               <a:ext uri="{91240B29-F687-4f45-9708-019B960494DF}">
-                <a14:hiddenLine xmlns:a14="http://schemas.microsoft.com/office/drawing/2010/main" xmlns="" w="9525">
+                <a14:hiddenLine xmlns="" xmlns:a14="http://schemas.microsoft.com/office/drawing/2010/main" w="9525">
                   <a:solidFill>
                     <a:srgbClr val="000000"/>
                   </a:solidFill>
@@ -3450,7 +3451,7 @@
             </a:ln>
             <a:extLst>
               <a:ext uri="{91240B29-F687-4f45-9708-019B960494DF}">
-                <a14:hiddenLine xmlns:a14="http://schemas.microsoft.com/office/drawing/2010/main" xmlns="" w="9525">
+                <a14:hiddenLine xmlns="" xmlns:a14="http://schemas.microsoft.com/office/drawing/2010/main" w="9525">
                   <a:solidFill>
                     <a:srgbClr val="000000"/>
                   </a:solidFill>
@@ -3540,7 +3541,7 @@
             </a:ln>
             <a:extLst>
               <a:ext uri="{91240B29-F687-4f45-9708-019B960494DF}">
-                <a14:hiddenLine xmlns:a14="http://schemas.microsoft.com/office/drawing/2010/main" xmlns="" w="9525">
+                <a14:hiddenLine xmlns="" xmlns:a14="http://schemas.microsoft.com/office/drawing/2010/main" w="9525">
                   <a:solidFill>
                     <a:srgbClr val="000000"/>
                   </a:solidFill>
@@ -3630,7 +3631,7 @@
             </a:ln>
             <a:extLst>
               <a:ext uri="{91240B29-F687-4f45-9708-019B960494DF}">
-                <a14:hiddenLine xmlns:a14="http://schemas.microsoft.com/office/drawing/2010/main" xmlns="" w="9525">
+                <a14:hiddenLine xmlns="" xmlns:a14="http://schemas.microsoft.com/office/drawing/2010/main" w="9525">
                   <a:solidFill>
                     <a:srgbClr val="000000"/>
                   </a:solidFill>
@@ -3695,7 +3696,7 @@
             </a:ln>
             <a:extLst>
               <a:ext uri="{91240B29-F687-4f45-9708-019B960494DF}">
-                <a14:hiddenLine xmlns:a14="http://schemas.microsoft.com/office/drawing/2010/main" xmlns="" w="9525">
+                <a14:hiddenLine xmlns="" xmlns:a14="http://schemas.microsoft.com/office/drawing/2010/main" w="9525">
                   <a:solidFill>
                     <a:srgbClr val="000000"/>
                   </a:solidFill>
@@ -3757,7 +3758,7 @@
             </a:ln>
             <a:extLst>
               <a:ext uri="{91240B29-F687-4f45-9708-019B960494DF}">
-                <a14:hiddenLine xmlns:a14="http://schemas.microsoft.com/office/drawing/2010/main" xmlns="" w="9525">
+                <a14:hiddenLine xmlns="" xmlns:a14="http://schemas.microsoft.com/office/drawing/2010/main" w="9525">
                   <a:solidFill>
                     <a:srgbClr val="000000"/>
                   </a:solidFill>
@@ -3847,7 +3848,7 @@
             </a:ln>
             <a:extLst>
               <a:ext uri="{91240B29-F687-4f45-9708-019B960494DF}">
-                <a14:hiddenLine xmlns:a14="http://schemas.microsoft.com/office/drawing/2010/main" xmlns="" w="9525">
+                <a14:hiddenLine xmlns="" xmlns:a14="http://schemas.microsoft.com/office/drawing/2010/main" w="9525">
                   <a:solidFill>
                     <a:srgbClr val="000000"/>
                   </a:solidFill>
@@ -3937,7 +3938,7 @@
             </a:ln>
             <a:extLst>
               <a:ext uri="{91240B29-F687-4f45-9708-019B960494DF}">
-                <a14:hiddenLine xmlns:a14="http://schemas.microsoft.com/office/drawing/2010/main" xmlns="" w="9525">
+                <a14:hiddenLine xmlns="" xmlns:a14="http://schemas.microsoft.com/office/drawing/2010/main" w="9525">
                   <a:solidFill>
                     <a:srgbClr val="000000"/>
                   </a:solidFill>
@@ -3999,7 +4000,7 @@
             </a:ln>
             <a:extLst>
               <a:ext uri="{91240B29-F687-4f45-9708-019B960494DF}">
-                <a14:hiddenLine xmlns:a14="http://schemas.microsoft.com/office/drawing/2010/main" xmlns="" w="9525">
+                <a14:hiddenLine xmlns="" xmlns:a14="http://schemas.microsoft.com/office/drawing/2010/main" w="9525">
                   <a:solidFill>
                     <a:srgbClr val="000000"/>
                   </a:solidFill>
@@ -4119,7 +4120,7 @@
             </a:ln>
             <a:extLst>
               <a:ext uri="{91240B29-F687-4f45-9708-019B960494DF}">
-                <a14:hiddenLine xmlns:a14="http://schemas.microsoft.com/office/drawing/2010/main" xmlns="" w="9525">
+                <a14:hiddenLine xmlns="" xmlns:a14="http://schemas.microsoft.com/office/drawing/2010/main" w="9525">
                   <a:solidFill>
                     <a:srgbClr val="000000"/>
                   </a:solidFill>
@@ -4187,7 +4188,7 @@
             </a:ln>
             <a:extLst>
               <a:ext uri="{91240B29-F687-4f45-9708-019B960494DF}">
-                <a14:hiddenLine xmlns:a14="http://schemas.microsoft.com/office/drawing/2010/main" xmlns="" w="9525">
+                <a14:hiddenLine xmlns="" xmlns:a14="http://schemas.microsoft.com/office/drawing/2010/main" w="9525">
                   <a:solidFill>
                     <a:srgbClr val="000000"/>
                   </a:solidFill>
@@ -4277,7 +4278,7 @@
             </a:ln>
             <a:extLst>
               <a:ext uri="{91240B29-F687-4f45-9708-019B960494DF}">
-                <a14:hiddenLine xmlns:a14="http://schemas.microsoft.com/office/drawing/2010/main" xmlns="" w="9525">
+                <a14:hiddenLine xmlns="" xmlns:a14="http://schemas.microsoft.com/office/drawing/2010/main" w="9525">
                   <a:solidFill>
                     <a:srgbClr val="000000"/>
                   </a:solidFill>
@@ -4418,7 +4419,7 @@
             <a:fld id="{48A87A34-81AB-432B-8DAE-1953F412C126}" type="datetimeFigureOut">
               <a:rPr lang="en-US" dirty="0"/>
               <a:pPr/>
-              <a:t>4/22/2018</a:t>
+              <a:t>4/23/2018</a:t>
             </a:fld>
             <a:endParaRPr lang="en-US" dirty="0"/>
           </a:p>
@@ -4690,7 +4691,7 @@
             <a:fld id="{48A87A34-81AB-432B-8DAE-1953F412C126}" type="datetimeFigureOut">
               <a:rPr lang="en-US" dirty="0"/>
               <a:pPr/>
-              <a:t>4/22/2018</a:t>
+              <a:t>4/23/2018</a:t>
             </a:fld>
             <a:endParaRPr lang="en-US" dirty="0"/>
           </a:p>
@@ -4891,7 +4892,7 @@
             <a:fld id="{48A87A34-81AB-432B-8DAE-1953F412C126}" type="datetimeFigureOut">
               <a:rPr lang="en-US" dirty="0"/>
               <a:pPr/>
-              <a:t>4/22/2018</a:t>
+              <a:t>4/23/2018</a:t>
             </a:fld>
             <a:endParaRPr lang="en-US" dirty="0"/>
           </a:p>
@@ -5159,7 +5160,7 @@
             <a:fld id="{48A87A34-81AB-432B-8DAE-1953F412C126}" type="datetimeFigureOut">
               <a:rPr lang="en-US" dirty="0"/>
               <a:pPr/>
-              <a:t>4/22/2018</a:t>
+              <a:t>4/23/2018</a:t>
             </a:fld>
             <a:endParaRPr lang="en-US" dirty="0"/>
           </a:p>
@@ -5598,7 +5599,7 @@
             <a:fld id="{48A87A34-81AB-432B-8DAE-1953F412C126}" type="datetimeFigureOut">
               <a:rPr lang="en-US" dirty="0"/>
               <a:pPr/>
-              <a:t>4/22/2018</a:t>
+              <a:t>4/23/2018</a:t>
             </a:fld>
             <a:endParaRPr lang="en-US" dirty="0"/>
           </a:p>
@@ -6149,7 +6150,7 @@
             <a:fld id="{48A87A34-81AB-432B-8DAE-1953F412C126}" type="datetimeFigureOut">
               <a:rPr lang="en-US" dirty="0"/>
               <a:pPr/>
-              <a:t>4/22/2018</a:t>
+              <a:t>4/23/2018</a:t>
             </a:fld>
             <a:endParaRPr lang="en-US" dirty="0"/>
           </a:p>
@@ -6874,7 +6875,7 @@
             <a:fld id="{48A87A34-81AB-432B-8DAE-1953F412C126}" type="datetimeFigureOut">
               <a:rPr lang="en-US" dirty="0"/>
               <a:pPr/>
-              <a:t>4/22/2018</a:t>
+              <a:t>4/23/2018</a:t>
             </a:fld>
             <a:endParaRPr lang="en-US" dirty="0"/>
           </a:p>
@@ -7049,7 +7050,7 @@
             <a:fld id="{48A87A34-81AB-432B-8DAE-1953F412C126}" type="datetimeFigureOut">
               <a:rPr lang="en-US" dirty="0"/>
               <a:pPr/>
-              <a:t>4/22/2018</a:t>
+              <a:t>4/23/2018</a:t>
             </a:fld>
             <a:endParaRPr lang="en-US" dirty="0"/>
           </a:p>
@@ -7234,7 +7235,7 @@
             <a:fld id="{48A87A34-81AB-432B-8DAE-1953F412C126}" type="datetimeFigureOut">
               <a:rPr lang="en-US" dirty="0"/>
               <a:pPr/>
-              <a:t>4/22/2018</a:t>
+              <a:t>4/23/2018</a:t>
             </a:fld>
             <a:endParaRPr lang="en-US" dirty="0"/>
           </a:p>
@@ -7409,7 +7410,7 @@
             <a:fld id="{48A87A34-81AB-432B-8DAE-1953F412C126}" type="datetimeFigureOut">
               <a:rPr lang="en-US" dirty="0"/>
               <a:pPr/>
-              <a:t>4/22/2018</a:t>
+              <a:t>4/23/2018</a:t>
             </a:fld>
             <a:endParaRPr lang="en-US" dirty="0"/>
           </a:p>
@@ -7664,7 +7665,7 @@
             <a:fld id="{48A87A34-81AB-432B-8DAE-1953F412C126}" type="datetimeFigureOut">
               <a:rPr lang="en-US" dirty="0"/>
               <a:pPr/>
-              <a:t>4/22/2018</a:t>
+              <a:t>4/23/2018</a:t>
             </a:fld>
             <a:endParaRPr lang="en-US" dirty="0"/>
           </a:p>
@@ -7901,7 +7902,7 @@
             <a:fld id="{48A87A34-81AB-432B-8DAE-1953F412C126}" type="datetimeFigureOut">
               <a:rPr lang="en-US" dirty="0"/>
               <a:pPr/>
-              <a:t>4/22/2018</a:t>
+              <a:t>4/23/2018</a:t>
             </a:fld>
             <a:endParaRPr lang="en-US" dirty="0"/>
           </a:p>
@@ -8287,7 +8288,7 @@
             <a:fld id="{48A87A34-81AB-432B-8DAE-1953F412C126}" type="datetimeFigureOut">
               <a:rPr lang="en-US" dirty="0"/>
               <a:pPr/>
-              <a:t>4/22/2018</a:t>
+              <a:t>4/23/2018</a:t>
             </a:fld>
             <a:endParaRPr lang="en-US" dirty="0"/>
           </a:p>
@@ -8410,7 +8411,7 @@
             <a:fld id="{48A87A34-81AB-432B-8DAE-1953F412C126}" type="datetimeFigureOut">
               <a:rPr lang="en-US" dirty="0"/>
               <a:pPr/>
-              <a:t>4/22/2018</a:t>
+              <a:t>4/23/2018</a:t>
             </a:fld>
             <a:endParaRPr lang="en-US" dirty="0"/>
           </a:p>
@@ -8510,7 +8511,7 @@
             <a:fld id="{48A87A34-81AB-432B-8DAE-1953F412C126}" type="datetimeFigureOut">
               <a:rPr lang="en-US" dirty="0"/>
               <a:pPr/>
-              <a:t>4/22/2018</a:t>
+              <a:t>4/23/2018</a:t>
             </a:fld>
             <a:endParaRPr lang="en-US" dirty="0"/>
           </a:p>
@@ -8764,7 +8765,7 @@
             <a:fld id="{48A87A34-81AB-432B-8DAE-1953F412C126}" type="datetimeFigureOut">
               <a:rPr lang="en-US" dirty="0"/>
               <a:pPr/>
-              <a:t>4/22/2018</a:t>
+              <a:t>4/23/2018</a:t>
             </a:fld>
             <a:endParaRPr lang="en-US" dirty="0"/>
           </a:p>
@@ -9049,7 +9050,7 @@
             <a:fld id="{48A87A34-81AB-432B-8DAE-1953F412C126}" type="datetimeFigureOut">
               <a:rPr lang="en-US" dirty="0"/>
               <a:pPr/>
-              <a:t>4/22/2018</a:t>
+              <a:t>4/23/2018</a:t>
             </a:fld>
             <a:endParaRPr lang="en-US" dirty="0"/>
           </a:p>
@@ -9144,7 +9145,7 @@
             <a:alphaModFix amt="30000"/>
             <a:extLst>
               <a:ext uri="{28A0092B-C50C-407E-A947-70E740481C1C}">
-                <a14:useLocalDpi xmlns:a14="http://schemas.microsoft.com/office/drawing/2010/main" val="0"/>
+                <a14:useLocalDpi xmlns:a14="http://schemas.microsoft.com/office/drawing/2010/main" xmlns="" val="0"/>
               </a:ext>
             </a:extLst>
           </a:blip>
@@ -9164,7 +9165,7 @@
           <a:noFill/>
           <a:extLst>
             <a:ext uri="{909E8E84-426E-40dd-AFC4-6F175D3DCCD1}">
-              <a14:hiddenFill xmlns:a14="http://schemas.microsoft.com/office/drawing/2010/main" xmlns="">
+              <a14:hiddenFill xmlns="" xmlns:a14="http://schemas.microsoft.com/office/drawing/2010/main">
                 <a:solidFill>
                   <a:srgbClr val="FFFFFF"/>
                 </a:solidFill>
@@ -9238,7 +9239,7 @@
               </a:ln>
               <a:extLst>
                 <a:ext uri="{91240B29-F687-4f45-9708-019B960494DF}">
-                  <a14:hiddenLine xmlns:a14="http://schemas.microsoft.com/office/drawing/2010/main" xmlns="" w="9525">
+                  <a14:hiddenLine xmlns="" xmlns:a14="http://schemas.microsoft.com/office/drawing/2010/main" w="9525">
                     <a:solidFill>
                       <a:srgbClr val="000000"/>
                     </a:solidFill>
@@ -9328,7 +9329,7 @@
               </a:ln>
               <a:extLst>
                 <a:ext uri="{91240B29-F687-4f45-9708-019B960494DF}">
-                  <a14:hiddenLine xmlns:a14="http://schemas.microsoft.com/office/drawing/2010/main" xmlns="" w="9525">
+                  <a14:hiddenLine xmlns="" xmlns:a14="http://schemas.microsoft.com/office/drawing/2010/main" w="9525">
                     <a:solidFill>
                       <a:srgbClr val="000000"/>
                     </a:solidFill>
@@ -9418,7 +9419,7 @@
               </a:ln>
               <a:extLst>
                 <a:ext uri="{91240B29-F687-4f45-9708-019B960494DF}">
-                  <a14:hiddenLine xmlns:a14="http://schemas.microsoft.com/office/drawing/2010/main" xmlns="" w="9525">
+                  <a14:hiddenLine xmlns="" xmlns:a14="http://schemas.microsoft.com/office/drawing/2010/main" w="9525">
                     <a:solidFill>
                       <a:srgbClr val="000000"/>
                     </a:solidFill>
@@ -9480,7 +9481,7 @@
               </a:ln>
               <a:extLst>
                 <a:ext uri="{91240B29-F687-4f45-9708-019B960494DF}">
-                  <a14:hiddenLine xmlns:a14="http://schemas.microsoft.com/office/drawing/2010/main" xmlns="" w="9525">
+                  <a14:hiddenLine xmlns="" xmlns:a14="http://schemas.microsoft.com/office/drawing/2010/main" w="9525">
                     <a:solidFill>
                       <a:srgbClr val="000000"/>
                     </a:solidFill>
@@ -9570,7 +9571,7 @@
               </a:ln>
               <a:extLst>
                 <a:ext uri="{91240B29-F687-4f45-9708-019B960494DF}">
-                  <a14:hiddenLine xmlns:a14="http://schemas.microsoft.com/office/drawing/2010/main" xmlns="" w="9525">
+                  <a14:hiddenLine xmlns="" xmlns:a14="http://schemas.microsoft.com/office/drawing/2010/main" w="9525">
                     <a:solidFill>
                       <a:srgbClr val="000000"/>
                     </a:solidFill>
@@ -9632,7 +9633,7 @@
               </a:ln>
               <a:extLst>
                 <a:ext uri="{91240B29-F687-4f45-9708-019B960494DF}">
-                  <a14:hiddenLine xmlns:a14="http://schemas.microsoft.com/office/drawing/2010/main" xmlns="" w="9525">
+                  <a14:hiddenLine xmlns="" xmlns:a14="http://schemas.microsoft.com/office/drawing/2010/main" w="9525">
                     <a:solidFill>
                       <a:srgbClr val="000000"/>
                     </a:solidFill>
@@ -9694,7 +9695,7 @@
               </a:ln>
               <a:extLst>
                 <a:ext uri="{91240B29-F687-4f45-9708-019B960494DF}">
-                  <a14:hiddenLine xmlns:a14="http://schemas.microsoft.com/office/drawing/2010/main" xmlns="" w="9525">
+                  <a14:hiddenLine xmlns="" xmlns:a14="http://schemas.microsoft.com/office/drawing/2010/main" w="9525">
                     <a:solidFill>
                       <a:srgbClr val="000000"/>
                     </a:solidFill>
@@ -9784,7 +9785,7 @@
               </a:ln>
               <a:extLst>
                 <a:ext uri="{91240B29-F687-4f45-9708-019B960494DF}">
-                  <a14:hiddenLine xmlns:a14="http://schemas.microsoft.com/office/drawing/2010/main" xmlns="" w="9525">
+                  <a14:hiddenLine xmlns="" xmlns:a14="http://schemas.microsoft.com/office/drawing/2010/main" w="9525">
                     <a:solidFill>
                       <a:srgbClr val="000000"/>
                     </a:solidFill>
@@ -9874,7 +9875,7 @@
               </a:ln>
               <a:extLst>
                 <a:ext uri="{91240B29-F687-4f45-9708-019B960494DF}">
-                  <a14:hiddenLine xmlns:a14="http://schemas.microsoft.com/office/drawing/2010/main" xmlns="" w="9525">
+                  <a14:hiddenLine xmlns="" xmlns:a14="http://schemas.microsoft.com/office/drawing/2010/main" w="9525">
                     <a:solidFill>
                       <a:srgbClr val="000000"/>
                     </a:solidFill>
@@ -9936,7 +9937,7 @@
               </a:ln>
               <a:extLst>
                 <a:ext uri="{91240B29-F687-4f45-9708-019B960494DF}">
-                  <a14:hiddenLine xmlns:a14="http://schemas.microsoft.com/office/drawing/2010/main" xmlns="" w="9525">
+                  <a14:hiddenLine xmlns="" xmlns:a14="http://schemas.microsoft.com/office/drawing/2010/main" w="9525">
                     <a:solidFill>
                       <a:srgbClr val="000000"/>
                     </a:solidFill>
@@ -10046,7 +10047,7 @@
               </a:ln>
               <a:extLst>
                 <a:ext uri="{91240B29-F687-4f45-9708-019B960494DF}">
-                  <a14:hiddenLine xmlns:a14="http://schemas.microsoft.com/office/drawing/2010/main" xmlns="" w="9525">
+                  <a14:hiddenLine xmlns="" xmlns:a14="http://schemas.microsoft.com/office/drawing/2010/main" w="9525">
                     <a:solidFill>
                       <a:srgbClr val="000000"/>
                     </a:solidFill>
@@ -10130,7 +10131,7 @@
               </a:ln>
               <a:extLst>
                 <a:ext uri="{91240B29-F687-4f45-9708-019B960494DF}">
-                  <a14:hiddenLine xmlns:a14="http://schemas.microsoft.com/office/drawing/2010/main" xmlns="" w="9525">
+                  <a14:hiddenLine xmlns="" xmlns:a14="http://schemas.microsoft.com/office/drawing/2010/main" w="9525">
                     <a:solidFill>
                       <a:srgbClr val="000000"/>
                     </a:solidFill>
@@ -10192,7 +10193,7 @@
               </a:ln>
               <a:extLst>
                 <a:ext uri="{91240B29-F687-4f45-9708-019B960494DF}">
-                  <a14:hiddenLine xmlns:a14="http://schemas.microsoft.com/office/drawing/2010/main" xmlns="" w="9525">
+                  <a14:hiddenLine xmlns="" xmlns:a14="http://schemas.microsoft.com/office/drawing/2010/main" w="9525">
                     <a:solidFill>
                       <a:srgbClr val="000000"/>
                     </a:solidFill>
@@ -10254,7 +10255,7 @@
               </a:ln>
               <a:extLst>
                 <a:ext uri="{91240B29-F687-4f45-9708-019B960494DF}">
-                  <a14:hiddenLine xmlns:a14="http://schemas.microsoft.com/office/drawing/2010/main" xmlns="" w="9525">
+                  <a14:hiddenLine xmlns="" xmlns:a14="http://schemas.microsoft.com/office/drawing/2010/main" w="9525">
                     <a:solidFill>
                       <a:srgbClr val="000000"/>
                     </a:solidFill>
@@ -10344,7 +10345,7 @@
               </a:ln>
               <a:extLst>
                 <a:ext uri="{91240B29-F687-4f45-9708-019B960494DF}">
-                  <a14:hiddenLine xmlns:a14="http://schemas.microsoft.com/office/drawing/2010/main" xmlns="" w="9525">
+                  <a14:hiddenLine xmlns="" xmlns:a14="http://schemas.microsoft.com/office/drawing/2010/main" w="9525">
                     <a:solidFill>
                       <a:srgbClr val="000000"/>
                     </a:solidFill>
@@ -10378,7 +10379,7 @@
               </a:ln>
               <a:extLst>
                 <a:ext uri="{91240B29-F687-4f45-9708-019B960494DF}">
-                  <a14:hiddenLine xmlns:a14="http://schemas.microsoft.com/office/drawing/2010/main" xmlns="" w="9525">
+                  <a14:hiddenLine xmlns="" xmlns:a14="http://schemas.microsoft.com/office/drawing/2010/main" w="9525">
                     <a:solidFill>
                       <a:srgbClr val="000000"/>
                     </a:solidFill>
@@ -10443,7 +10444,7 @@
               </a:ln>
               <a:extLst>
                 <a:ext uri="{91240B29-F687-4f45-9708-019B960494DF}">
-                  <a14:hiddenLine xmlns:a14="http://schemas.microsoft.com/office/drawing/2010/main" xmlns="" w="9525">
+                  <a14:hiddenLine xmlns="" xmlns:a14="http://schemas.microsoft.com/office/drawing/2010/main" w="9525">
                     <a:solidFill>
                       <a:srgbClr val="000000"/>
                     </a:solidFill>
@@ -10533,7 +10534,7 @@
               </a:ln>
               <a:extLst>
                 <a:ext uri="{91240B29-F687-4f45-9708-019B960494DF}">
-                  <a14:hiddenLine xmlns:a14="http://schemas.microsoft.com/office/drawing/2010/main" xmlns="" w="9525">
+                  <a14:hiddenLine xmlns="" xmlns:a14="http://schemas.microsoft.com/office/drawing/2010/main" w="9525">
                     <a:solidFill>
                       <a:srgbClr val="000000"/>
                     </a:solidFill>
@@ -10595,7 +10596,7 @@
               </a:ln>
               <a:extLst>
                 <a:ext uri="{91240B29-F687-4f45-9708-019B960494DF}">
-                  <a14:hiddenLine xmlns:a14="http://schemas.microsoft.com/office/drawing/2010/main" xmlns="" w="9525">
+                  <a14:hiddenLine xmlns="" xmlns:a14="http://schemas.microsoft.com/office/drawing/2010/main" w="9525">
                     <a:solidFill>
                       <a:srgbClr val="000000"/>
                     </a:solidFill>
@@ -10685,7 +10686,7 @@
               </a:ln>
               <a:extLst>
                 <a:ext uri="{91240B29-F687-4f45-9708-019B960494DF}">
-                  <a14:hiddenLine xmlns:a14="http://schemas.microsoft.com/office/drawing/2010/main" xmlns="" w="9525">
+                  <a14:hiddenLine xmlns="" xmlns:a14="http://schemas.microsoft.com/office/drawing/2010/main" w="9525">
                     <a:solidFill>
                       <a:srgbClr val="000000"/>
                     </a:solidFill>
@@ -10750,7 +10751,7 @@
               </a:ln>
               <a:extLst>
                 <a:ext uri="{91240B29-F687-4f45-9708-019B960494DF}">
-                  <a14:hiddenLine xmlns:a14="http://schemas.microsoft.com/office/drawing/2010/main" xmlns="" w="9525">
+                  <a14:hiddenLine xmlns="" xmlns:a14="http://schemas.microsoft.com/office/drawing/2010/main" w="9525">
                     <a:solidFill>
                       <a:srgbClr val="000000"/>
                     </a:solidFill>
@@ -10812,7 +10813,7 @@
               </a:ln>
               <a:extLst>
                 <a:ext uri="{91240B29-F687-4f45-9708-019B960494DF}">
-                  <a14:hiddenLine xmlns:a14="http://schemas.microsoft.com/office/drawing/2010/main" xmlns="" w="9525">
+                  <a14:hiddenLine xmlns="" xmlns:a14="http://schemas.microsoft.com/office/drawing/2010/main" w="9525">
                     <a:solidFill>
                       <a:srgbClr val="000000"/>
                     </a:solidFill>
@@ -10902,7 +10903,7 @@
               </a:ln>
               <a:extLst>
                 <a:ext uri="{91240B29-F687-4f45-9708-019B960494DF}">
-                  <a14:hiddenLine xmlns:a14="http://schemas.microsoft.com/office/drawing/2010/main" xmlns="" w="9525">
+                  <a14:hiddenLine xmlns="" xmlns:a14="http://schemas.microsoft.com/office/drawing/2010/main" w="9525">
                     <a:solidFill>
                       <a:srgbClr val="000000"/>
                     </a:solidFill>
@@ -10992,7 +10993,7 @@
               </a:ln>
               <a:extLst>
                 <a:ext uri="{91240B29-F687-4f45-9708-019B960494DF}">
-                  <a14:hiddenLine xmlns:a14="http://schemas.microsoft.com/office/drawing/2010/main" xmlns="" w="9525">
+                  <a14:hiddenLine xmlns="" xmlns:a14="http://schemas.microsoft.com/office/drawing/2010/main" w="9525">
                     <a:solidFill>
                       <a:srgbClr val="000000"/>
                     </a:solidFill>
@@ -11057,7 +11058,7 @@
               </a:ln>
               <a:extLst>
                 <a:ext uri="{91240B29-F687-4f45-9708-019B960494DF}">
-                  <a14:hiddenLine xmlns:a14="http://schemas.microsoft.com/office/drawing/2010/main" xmlns="" w="9525">
+                  <a14:hiddenLine xmlns="" xmlns:a14="http://schemas.microsoft.com/office/drawing/2010/main" w="9525">
                     <a:solidFill>
                       <a:srgbClr val="000000"/>
                     </a:solidFill>
@@ -11177,7 +11178,7 @@
               </a:ln>
               <a:extLst>
                 <a:ext uri="{91240B29-F687-4f45-9708-019B960494DF}">
-                  <a14:hiddenLine xmlns:a14="http://schemas.microsoft.com/office/drawing/2010/main" xmlns="" w="9525">
+                  <a14:hiddenLine xmlns="" xmlns:a14="http://schemas.microsoft.com/office/drawing/2010/main" w="9525">
                     <a:solidFill>
                       <a:srgbClr val="000000"/>
                     </a:solidFill>
@@ -11275,7 +11276,7 @@
               </a:ln>
               <a:extLst>
                 <a:ext uri="{91240B29-F687-4f45-9708-019B960494DF}">
-                  <a14:hiddenLine xmlns:a14="http://schemas.microsoft.com/office/drawing/2010/main" xmlns="" w="9525">
+                  <a14:hiddenLine xmlns="" xmlns:a14="http://schemas.microsoft.com/office/drawing/2010/main" w="9525">
                     <a:solidFill>
                       <a:srgbClr val="000000"/>
                     </a:solidFill>
@@ -11390,7 +11391,7 @@
               </a:ln>
               <a:extLst>
                 <a:ext uri="{91240B29-F687-4f45-9708-019B960494DF}">
-                  <a14:hiddenLine xmlns:a14="http://schemas.microsoft.com/office/drawing/2010/main" xmlns="" w="9525">
+                  <a14:hiddenLine xmlns="" xmlns:a14="http://schemas.microsoft.com/office/drawing/2010/main" w="9525">
                     <a:solidFill>
                       <a:srgbClr val="000000"/>
                     </a:solidFill>
@@ -11480,7 +11481,7 @@
               </a:ln>
               <a:extLst>
                 <a:ext uri="{91240B29-F687-4f45-9708-019B960494DF}">
-                  <a14:hiddenLine xmlns:a14="http://schemas.microsoft.com/office/drawing/2010/main" xmlns="" w="9525">
+                  <a14:hiddenLine xmlns="" xmlns:a14="http://schemas.microsoft.com/office/drawing/2010/main" w="9525">
                     <a:solidFill>
                       <a:srgbClr val="000000"/>
                     </a:solidFill>
@@ -11545,7 +11546,7 @@
               </a:ln>
               <a:extLst>
                 <a:ext uri="{91240B29-F687-4f45-9708-019B960494DF}">
-                  <a14:hiddenLine xmlns:a14="http://schemas.microsoft.com/office/drawing/2010/main" xmlns="" w="9525">
+                  <a14:hiddenLine xmlns="" xmlns:a14="http://schemas.microsoft.com/office/drawing/2010/main" w="9525">
                     <a:solidFill>
                       <a:srgbClr val="000000"/>
                     </a:solidFill>
@@ -11635,7 +11636,7 @@
               </a:ln>
               <a:extLst>
                 <a:ext uri="{91240B29-F687-4f45-9708-019B960494DF}">
-                  <a14:hiddenLine xmlns:a14="http://schemas.microsoft.com/office/drawing/2010/main" xmlns="" w="9525">
+                  <a14:hiddenLine xmlns="" xmlns:a14="http://schemas.microsoft.com/office/drawing/2010/main" w="9525">
                     <a:solidFill>
                       <a:srgbClr val="000000"/>
                     </a:solidFill>
@@ -11703,7 +11704,7 @@
               </a:ln>
               <a:extLst>
                 <a:ext uri="{91240B29-F687-4f45-9708-019B960494DF}">
-                  <a14:hiddenLine xmlns:a14="http://schemas.microsoft.com/office/drawing/2010/main" xmlns="" w="9525">
+                  <a14:hiddenLine xmlns="" xmlns:a14="http://schemas.microsoft.com/office/drawing/2010/main" w="9525">
                     <a:solidFill>
                       <a:srgbClr val="000000"/>
                     </a:solidFill>
@@ -11793,7 +11794,7 @@
               </a:ln>
               <a:extLst>
                 <a:ext uri="{91240B29-F687-4f45-9708-019B960494DF}">
-                  <a14:hiddenLine xmlns:a14="http://schemas.microsoft.com/office/drawing/2010/main" xmlns="" w="9525">
+                  <a14:hiddenLine xmlns="" xmlns:a14="http://schemas.microsoft.com/office/drawing/2010/main" w="9525">
                     <a:solidFill>
                       <a:srgbClr val="000000"/>
                     </a:solidFill>
@@ -11861,7 +11862,7 @@
               </a:ln>
               <a:extLst>
                 <a:ext uri="{91240B29-F687-4f45-9708-019B960494DF}">
-                  <a14:hiddenLine xmlns:a14="http://schemas.microsoft.com/office/drawing/2010/main" xmlns="" w="9525">
+                  <a14:hiddenLine xmlns="" xmlns:a14="http://schemas.microsoft.com/office/drawing/2010/main" w="9525">
                     <a:solidFill>
                       <a:srgbClr val="000000"/>
                     </a:solidFill>
@@ -11951,7 +11952,7 @@
               </a:ln>
               <a:extLst>
                 <a:ext uri="{91240B29-F687-4f45-9708-019B960494DF}">
-                  <a14:hiddenLine xmlns:a14="http://schemas.microsoft.com/office/drawing/2010/main" xmlns="" w="9525">
+                  <a14:hiddenLine xmlns="" xmlns:a14="http://schemas.microsoft.com/office/drawing/2010/main" w="9525">
                     <a:solidFill>
                       <a:srgbClr val="000000"/>
                     </a:solidFill>
@@ -11985,7 +11986,7 @@
               </a:ln>
               <a:extLst>
                 <a:ext uri="{91240B29-F687-4f45-9708-019B960494DF}">
-                  <a14:hiddenLine xmlns:a14="http://schemas.microsoft.com/office/drawing/2010/main" xmlns="" w="9525">
+                  <a14:hiddenLine xmlns="" xmlns:a14="http://schemas.microsoft.com/office/drawing/2010/main" w="9525">
                     <a:solidFill>
                       <a:srgbClr val="000000"/>
                     </a:solidFill>
@@ -12126,7 +12127,7 @@
             <a:fld id="{48A87A34-81AB-432B-8DAE-1953F412C126}" type="datetimeFigureOut">
               <a:rPr lang="en-US" dirty="0"/>
               <a:pPr/>
-              <a:t>4/22/2018</a:t>
+              <a:t>4/23/2018</a:t>
             </a:fld>
             <a:endParaRPr lang="en-US" dirty="0"/>
           </a:p>
@@ -12611,7 +12612,7 @@
           <p:cNvPr id="4" name="Image 4">
             <a:extLst>
               <a:ext uri="{FF2B5EF4-FFF2-40B4-BE49-F238E27FC236}">
-                <a16:creationId xmlns:a16="http://schemas.microsoft.com/office/drawing/2014/main" id="{9D456F27-971E-4B2E-A29A-BEA45D21B2BA}"/>
+                <a16:creationId xmlns:a16="http://schemas.microsoft.com/office/drawing/2014/main" xmlns="" id="{9D456F27-971E-4B2E-A29A-BEA45D21B2BA}"/>
               </a:ext>
             </a:extLst>
           </p:cNvPr>
@@ -12639,7 +12640,7 @@
     </p:spTree>
     <p:extLst>
       <p:ext uri="{BB962C8B-B14F-4D97-AF65-F5344CB8AC3E}">
-        <p14:creationId xmlns:p14="http://schemas.microsoft.com/office/powerpoint/2010/main" val="3856144342"/>
+        <p14:creationId xmlns:p14="http://schemas.microsoft.com/office/powerpoint/2010/main" xmlns="" val="3856144342"/>
       </p:ext>
     </p:extLst>
   </p:cSld>
@@ -12745,7 +12746,7 @@
           <a:blip r:embed="rId2">
             <a:extLst>
               <a:ext uri="{28A0092B-C50C-407E-A947-70E740481C1C}">
-                <a14:useLocalDpi xmlns:a14="http://schemas.microsoft.com/office/drawing/2010/main" val="0"/>
+                <a14:useLocalDpi xmlns:a14="http://schemas.microsoft.com/office/drawing/2010/main" xmlns="" val="0"/>
               </a:ext>
             </a:extLst>
           </a:blip>
@@ -12755,7 +12756,7 @@
         </p:blipFill>
         <p:spPr>
           <a:xfrm>
-            <a:off x="3325563" y="0"/>
+            <a:off x="3750678" y="0"/>
             <a:ext cx="5066212" cy="6858000"/>
           </a:xfrm>
         </p:spPr>
@@ -12763,7 +12764,7 @@
     </p:spTree>
     <p:extLst>
       <p:ext uri="{BB962C8B-B14F-4D97-AF65-F5344CB8AC3E}">
-        <p14:creationId xmlns:p14="http://schemas.microsoft.com/office/powerpoint/2010/main" val="4220309742"/>
+        <p14:creationId xmlns:p14="http://schemas.microsoft.com/office/powerpoint/2010/main" xmlns="" val="4220309742"/>
       </p:ext>
     </p:extLst>
   </p:cSld>
@@ -12777,6 +12778,140 @@
       </p:par>
     </p:tnLst>
   </p:timing>
+</p:sld>
+</file>
+
+<file path=ppt/slides/slide12.xml><?xml version="1.0" encoding="utf-8"?>
+<p:sld xmlns:a="http://schemas.openxmlformats.org/drawingml/2006/main" xmlns:r="http://schemas.openxmlformats.org/officeDocument/2006/relationships" xmlns:p="http://schemas.openxmlformats.org/presentationml/2006/main">
+  <p:cSld>
+    <p:spTree>
+      <p:nvGrpSpPr>
+        <p:cNvPr id="1" name=""/>
+        <p:cNvGrpSpPr/>
+        <p:nvPr/>
+      </p:nvGrpSpPr>
+      <p:grpSpPr>
+        <a:xfrm>
+          <a:off x="0" y="0"/>
+          <a:ext cx="0" cy="0"/>
+          <a:chOff x="0" y="0"/>
+          <a:chExt cx="0" cy="0"/>
+        </a:xfrm>
+      </p:grpSpPr>
+      <p:sp>
+        <p:nvSpPr>
+          <p:cNvPr id="2" name="Titre 1"/>
+          <p:cNvSpPr>
+            <a:spLocks noGrp="1"/>
+          </p:cNvSpPr>
+          <p:nvPr>
+            <p:ph type="title"/>
+          </p:nvPr>
+        </p:nvSpPr>
+        <p:spPr>
+          <a:xfrm>
+            <a:off x="1678824" y="0"/>
+            <a:ext cx="9905999" cy="1478570"/>
+          </a:xfrm>
+        </p:spPr>
+        <p:txBody>
+          <a:bodyPr/>
+          <a:lstStyle/>
+          <a:p>
+            <a:pPr algn="ctr"/>
+            <a:r>
+              <a:rPr lang="fr-FR" dirty="0" smtClean="0"/>
+              <a:t>Ce qui me reste à faire ! </a:t>
+            </a:r>
+            <a:endParaRPr lang="fr-FR" dirty="0"/>
+          </a:p>
+        </p:txBody>
+      </p:sp>
+      <p:pic>
+        <p:nvPicPr>
+          <p:cNvPr id="1026" name="Picture 2" descr="C:\Users\delauner\Documents\GitHub\Station_Meteo\Documentation\Station_meteo_aeroclub\batterie.jpg"/>
+          <p:cNvPicPr>
+            <a:picLocks noChangeAspect="1" noChangeArrowheads="1"/>
+          </p:cNvPicPr>
+          <p:nvPr/>
+        </p:nvPicPr>
+        <p:blipFill>
+          <a:blip r:embed="rId2"/>
+          <a:srcRect/>
+          <a:stretch>
+            <a:fillRect/>
+          </a:stretch>
+        </p:blipFill>
+        <p:spPr bwMode="auto">
+          <a:xfrm>
+            <a:off x="0" y="4714875"/>
+            <a:ext cx="2143125" cy="2143125"/>
+          </a:xfrm>
+          <a:prstGeom prst="rect">
+            <a:avLst/>
+          </a:prstGeom>
+          <a:noFill/>
+        </p:spPr>
+      </p:pic>
+      <p:pic>
+        <p:nvPicPr>
+          <p:cNvPr id="1028" name="Picture 4" descr="C:\Users\delauner\Documents\GitHub\Station_Meteo\Documentation\Station_meteo_aeroclub\regulateur.jpg"/>
+          <p:cNvPicPr>
+            <a:picLocks noChangeAspect="1" noChangeArrowheads="1"/>
+          </p:cNvPicPr>
+          <p:nvPr/>
+        </p:nvPicPr>
+        <p:blipFill>
+          <a:blip r:embed="rId3"/>
+          <a:srcRect/>
+          <a:stretch>
+            <a:fillRect/>
+          </a:stretch>
+        </p:blipFill>
+        <p:spPr bwMode="auto">
+          <a:xfrm>
+            <a:off x="0" y="1291389"/>
+            <a:ext cx="2143125" cy="2143125"/>
+          </a:xfrm>
+          <a:prstGeom prst="rect">
+            <a:avLst/>
+          </a:prstGeom>
+          <a:noFill/>
+        </p:spPr>
+      </p:pic>
+      <p:pic>
+        <p:nvPicPr>
+          <p:cNvPr id="1029" name="Picture 5" descr="C:\Users\delauner\Documents\GitHub\Station_Meteo\Documentation\Station_meteo_aeroclub\kit_solaire.jpg"/>
+          <p:cNvPicPr>
+            <a:picLocks noGrp="1" noChangeAspect="1" noChangeArrowheads="1"/>
+          </p:cNvPicPr>
+          <p:nvPr>
+            <p:ph idx="1"/>
+          </p:nvPr>
+        </p:nvPicPr>
+        <p:blipFill>
+          <a:blip r:embed="rId4"/>
+          <a:srcRect/>
+          <a:stretch>
+            <a:fillRect/>
+          </a:stretch>
+        </p:blipFill>
+        <p:spPr bwMode="auto">
+          <a:xfrm>
+            <a:off x="10048875" y="2253916"/>
+            <a:ext cx="2143125" cy="2143125"/>
+          </a:xfrm>
+          <a:prstGeom prst="rect">
+            <a:avLst/>
+          </a:prstGeom>
+          <a:noFill/>
+        </p:spPr>
+      </p:pic>
+    </p:spTree>
+  </p:cSld>
+  <p:clrMapOvr>
+    <a:masterClrMapping/>
+  </p:clrMapOvr>
 </p:sld>
 </file>
 
@@ -12802,7 +12937,7 @@
           <p:cNvPr id="2" name="Titre 1">
             <a:extLst>
               <a:ext uri="{FF2B5EF4-FFF2-40B4-BE49-F238E27FC236}">
-                <a16:creationId xmlns:a16="http://schemas.microsoft.com/office/drawing/2014/main" id="{F3B105B8-49D5-4A9B-B43F-C0CD6DC7214E}"/>
+                <a16:creationId xmlns:a16="http://schemas.microsoft.com/office/drawing/2014/main" xmlns="" id="{F3B105B8-49D5-4A9B-B43F-C0CD6DC7214E}"/>
               </a:ext>
             </a:extLst>
           </p:cNvPr>
@@ -12837,7 +12972,7 @@
           <p:cNvPr id="4" name="Image 4" descr="Une image contenant extérieur, route, ciel, herbe&#10;&#10;Description générée avec un niveau de confiance très élevé">
             <a:extLst>
               <a:ext uri="{FF2B5EF4-FFF2-40B4-BE49-F238E27FC236}">
-                <a16:creationId xmlns:a16="http://schemas.microsoft.com/office/drawing/2014/main" id="{6F9A7370-23C6-4C71-A2C9-172E4EA8F6BA}"/>
+                <a16:creationId xmlns:a16="http://schemas.microsoft.com/office/drawing/2014/main" xmlns="" id="{6F9A7370-23C6-4C71-A2C9-172E4EA8F6BA}"/>
               </a:ext>
             </a:extLst>
           </p:cNvPr>
@@ -12869,7 +13004,7 @@
           <p:cNvPr id="3" name="Image 4" descr="Une image contenant ciel, extérieur, bâtiment&#10;&#10;Description générée avec un niveau de confiance très élevé">
             <a:extLst>
               <a:ext uri="{FF2B5EF4-FFF2-40B4-BE49-F238E27FC236}">
-                <a16:creationId xmlns:a16="http://schemas.microsoft.com/office/drawing/2014/main" id="{3A543816-6EE4-4510-9C46-C728AF72E6B9}"/>
+                <a16:creationId xmlns:a16="http://schemas.microsoft.com/office/drawing/2014/main" xmlns="" id="{3A543816-6EE4-4510-9C46-C728AF72E6B9}"/>
               </a:ext>
             </a:extLst>
           </p:cNvPr>
@@ -12897,7 +13032,7 @@
     </p:spTree>
     <p:extLst>
       <p:ext uri="{BB962C8B-B14F-4D97-AF65-F5344CB8AC3E}">
-        <p14:creationId xmlns:p14="http://schemas.microsoft.com/office/powerpoint/2010/main" val="873175452"/>
+        <p14:creationId xmlns:p14="http://schemas.microsoft.com/office/powerpoint/2010/main" xmlns="" val="873175452"/>
       </p:ext>
     </p:extLst>
   </p:cSld>
@@ -12977,11 +13112,6 @@
               </a:rPr>
               <a:t>Descriptif de la partie</a:t>
             </a:r>
-            <a:endParaRPr lang="fr-FR" dirty="0">
-              <a:solidFill>
-                <a:srgbClr val="00B0F0"/>
-              </a:solidFill>
-            </a:endParaRPr>
           </a:p>
         </p:txBody>
       </p:sp>
@@ -13182,11 +13312,6 @@
               </a:rPr>
               <a:t>Schéma partie capteur</a:t>
             </a:r>
-            <a:endParaRPr lang="fr-FR" dirty="0">
-              <a:solidFill>
-                <a:srgbClr val="00B0F0"/>
-              </a:solidFill>
-            </a:endParaRPr>
           </a:p>
         </p:txBody>
       </p:sp>
@@ -13303,11 +13428,6 @@
               </a:rPr>
               <a:t>de la partie Capteur</a:t>
             </a:r>
-            <a:endParaRPr lang="fr-FR" dirty="0">
-              <a:solidFill>
-                <a:srgbClr val="00B0F0"/>
-              </a:solidFill>
-            </a:endParaRPr>
           </a:p>
         </p:txBody>
       </p:sp>
@@ -13325,7 +13445,7 @@
           <a:blip r:embed="rId2">
             <a:extLst>
               <a:ext uri="{28A0092B-C50C-407E-A947-70E740481C1C}">
-                <a14:useLocalDpi xmlns:a14="http://schemas.microsoft.com/office/drawing/2010/main" val="0"/>
+                <a14:useLocalDpi xmlns:a14="http://schemas.microsoft.com/office/drawing/2010/main" xmlns="" val="0"/>
               </a:ext>
             </a:extLst>
           </a:blip>
@@ -13418,11 +13538,6 @@
               </a:rPr>
               <a:t>Trame Attendue et Adaptation de tension</a:t>
             </a:r>
-            <a:endParaRPr lang="fr-FR" dirty="0">
-              <a:solidFill>
-                <a:srgbClr val="00B0F0"/>
-              </a:solidFill>
-            </a:endParaRPr>
           </a:p>
         </p:txBody>
       </p:sp>
@@ -13676,11 +13791,6 @@
               </a:rPr>
               <a:t>(Trame MWV et XDR)</a:t>
             </a:r>
-            <a:endParaRPr lang="fr-FR" dirty="0">
-              <a:solidFill>
-                <a:srgbClr val="00B0F0"/>
-              </a:solidFill>
-            </a:endParaRPr>
           </a:p>
         </p:txBody>
       </p:sp>
@@ -14077,7 +14187,7 @@
   <a:extraClrSchemeLst/>
   <a:extLst>
     <a:ext uri="{05A4C25C-085E-4340-85A3-A5531E510DB2}">
-      <thm15:themeFamily xmlns:thm15="http://schemas.microsoft.com/office/thememl/2012/main" name="Circuit" id="{0AC2F7E7-15F5-431C-B2A2-456FE929F56C}" vid="{0911B802-464C-4241-8DD9-B60FF88E379F}"/>
+      <thm15:themeFamily xmlns:thm15="http://schemas.microsoft.com/office/thememl/2012/main" xmlns="" name="Circuit" id="{0AC2F7E7-15F5-431C-B2A2-456FE929F56C}" vid="{0911B802-464C-4241-8DD9-B60FF88E379F}"/>
     </a:ext>
   </a:extLst>
 </a:theme>

</xml_diff>